<commit_message>
Added presentation slides and pdfs
</commit_message>
<xml_diff>
--- a/resources/workshop-presentations/aqmen_predictive-analytics-hackathon_201903.pptx
+++ b/resources/workshop-presentations/aqmen_predictive-analytics-hackathon_201903.pptx
@@ -247,7 +247,7 @@
           <a:p>
             <a:fld id="{7243B7D1-82D5-4605-8EBD-CBC68623EA80}" type="datetimeFigureOut">
               <a:rPr lang="en-GB" smtClean="0"/>
-              <a:t>05/03/2019</a:t>
+              <a:t>06/03/2019</a:t>
             </a:fld>
             <a:endParaRPr lang="en-GB"/>
           </a:p>
@@ -417,7 +417,7 @@
           <a:p>
             <a:fld id="{7243B7D1-82D5-4605-8EBD-CBC68623EA80}" type="datetimeFigureOut">
               <a:rPr lang="en-GB" smtClean="0"/>
-              <a:t>05/03/2019</a:t>
+              <a:t>06/03/2019</a:t>
             </a:fld>
             <a:endParaRPr lang="en-GB"/>
           </a:p>
@@ -597,7 +597,7 @@
           <a:p>
             <a:fld id="{7243B7D1-82D5-4605-8EBD-CBC68623EA80}" type="datetimeFigureOut">
               <a:rPr lang="en-GB" smtClean="0"/>
-              <a:t>05/03/2019</a:t>
+              <a:t>06/03/2019</a:t>
             </a:fld>
             <a:endParaRPr lang="en-GB"/>
           </a:p>
@@ -767,7 +767,7 @@
           <a:p>
             <a:fld id="{7243B7D1-82D5-4605-8EBD-CBC68623EA80}" type="datetimeFigureOut">
               <a:rPr lang="en-GB" smtClean="0"/>
-              <a:t>05/03/2019</a:t>
+              <a:t>06/03/2019</a:t>
             </a:fld>
             <a:endParaRPr lang="en-GB"/>
           </a:p>
@@ -1013,7 +1013,7 @@
           <a:p>
             <a:fld id="{7243B7D1-82D5-4605-8EBD-CBC68623EA80}" type="datetimeFigureOut">
               <a:rPr lang="en-GB" smtClean="0"/>
-              <a:t>05/03/2019</a:t>
+              <a:t>06/03/2019</a:t>
             </a:fld>
             <a:endParaRPr lang="en-GB"/>
           </a:p>
@@ -1245,7 +1245,7 @@
           <a:p>
             <a:fld id="{7243B7D1-82D5-4605-8EBD-CBC68623EA80}" type="datetimeFigureOut">
               <a:rPr lang="en-GB" smtClean="0"/>
-              <a:t>05/03/2019</a:t>
+              <a:t>06/03/2019</a:t>
             </a:fld>
             <a:endParaRPr lang="en-GB"/>
           </a:p>
@@ -1612,7 +1612,7 @@
           <a:p>
             <a:fld id="{7243B7D1-82D5-4605-8EBD-CBC68623EA80}" type="datetimeFigureOut">
               <a:rPr lang="en-GB" smtClean="0"/>
-              <a:t>05/03/2019</a:t>
+              <a:t>06/03/2019</a:t>
             </a:fld>
             <a:endParaRPr lang="en-GB"/>
           </a:p>
@@ -1730,7 +1730,7 @@
           <a:p>
             <a:fld id="{7243B7D1-82D5-4605-8EBD-CBC68623EA80}" type="datetimeFigureOut">
               <a:rPr lang="en-GB" smtClean="0"/>
-              <a:t>05/03/2019</a:t>
+              <a:t>06/03/2019</a:t>
             </a:fld>
             <a:endParaRPr lang="en-GB"/>
           </a:p>
@@ -1825,7 +1825,7 @@
           <a:p>
             <a:fld id="{7243B7D1-82D5-4605-8EBD-CBC68623EA80}" type="datetimeFigureOut">
               <a:rPr lang="en-GB" smtClean="0"/>
-              <a:t>05/03/2019</a:t>
+              <a:t>06/03/2019</a:t>
             </a:fld>
             <a:endParaRPr lang="en-GB"/>
           </a:p>
@@ -2102,7 +2102,7 @@
           <a:p>
             <a:fld id="{7243B7D1-82D5-4605-8EBD-CBC68623EA80}" type="datetimeFigureOut">
               <a:rPr lang="en-GB" smtClean="0"/>
-              <a:t>05/03/2019</a:t>
+              <a:t>06/03/2019</a:t>
             </a:fld>
             <a:endParaRPr lang="en-GB"/>
           </a:p>
@@ -2355,7 +2355,7 @@
           <a:p>
             <a:fld id="{7243B7D1-82D5-4605-8EBD-CBC68623EA80}" type="datetimeFigureOut">
               <a:rPr lang="en-GB" smtClean="0"/>
-              <a:t>05/03/2019</a:t>
+              <a:t>06/03/2019</a:t>
             </a:fld>
             <a:endParaRPr lang="en-GB"/>
           </a:p>
@@ -2568,7 +2568,7 @@
           <a:p>
             <a:fld id="{7243B7D1-82D5-4605-8EBD-CBC68623EA80}" type="datetimeFigureOut">
               <a:rPr lang="en-GB" smtClean="0"/>
-              <a:t>05/03/2019</a:t>
+              <a:t>06/03/2019</a:t>
             </a:fld>
             <a:endParaRPr lang="en-GB"/>
           </a:p>
@@ -4195,14 +4195,18 @@
           <a:p>
             <a:pPr algn="ctr"/>
             <a:r>
-              <a:rPr lang="en-GB" sz="6300" dirty="0" smtClean="0"/>
-              <a:t>Predictive Analytics</a:t>
-            </a:r>
-            <a:r>
-              <a:rPr lang="en-GB" altLang="en-US" sz="1600" dirty="0" smtClean="0">
+              <a:rPr lang="en-GB" sz="6300" smtClean="0"/>
+              <a:t>Predictive </a:t>
+            </a:r>
+            <a:r>
+              <a:rPr lang="en-GB" sz="6300" smtClean="0"/>
+              <a:t>Analytics</a:t>
+            </a:r>
+            <a:r>
+              <a:rPr lang="en-GB" altLang="en-US" sz="1600" smtClean="0">
                 <a:latin typeface="Calibri Light" pitchFamily="34" charset="0"/>
               </a:rPr>
-              <a:t>© </a:t>
+              <a:t> </a:t>
             </a:r>
             <a:endParaRPr lang="en-GB" altLang="en-US" sz="1600" b="1" dirty="0">
               <a:latin typeface="Calibri Light" pitchFamily="34" charset="0"/>
@@ -4559,15 +4563,7 @@
           <a:p>
             <a:r>
               <a:rPr lang="en-GB" dirty="0" smtClean="0"/>
-              <a:t>Dedicated blocks of </a:t>
-            </a:r>
-            <a:r>
-              <a:rPr lang="en-GB" dirty="0" smtClean="0"/>
-              <a:t>predictive analytics </a:t>
-            </a:r>
-            <a:r>
-              <a:rPr lang="en-GB" dirty="0" smtClean="0"/>
-              <a:t>practice that you otherwise would probably struggle to carve out time for in a typical week.</a:t>
+              <a:t>Dedicated blocks of predictive analytics practice that you otherwise would probably struggle to carve out time for in a typical week.</a:t>
             </a:r>
           </a:p>
           <a:p>
@@ -4669,33 +4665,13 @@
           <a:p>
             <a:r>
               <a:rPr lang="en-GB" dirty="0" smtClean="0"/>
-              <a:t>If stuck ask the tutors for assistance. However, this is not an assignment and there isn’t an official solution, so use that freedom to make mistakes and to try out different </a:t>
-            </a:r>
+              <a:t>If stuck ask the tutors for assistance. However, this is not an assignment and there isn’t an official solution, so use that freedom to make mistakes and to try out different statistical modelling approaches.</a:t>
+            </a:r>
+          </a:p>
+          <a:p>
             <a:r>
               <a:rPr lang="en-GB" dirty="0" smtClean="0"/>
-              <a:t>statistical modelling</a:t>
-            </a:r>
-            <a:r>
-              <a:rPr lang="en-GB" dirty="0" smtClean="0"/>
-              <a:t> </a:t>
-            </a:r>
-            <a:r>
-              <a:rPr lang="en-GB" dirty="0" smtClean="0"/>
-              <a:t>approaches.</a:t>
-            </a:r>
-          </a:p>
-          <a:p>
-            <a:r>
-              <a:rPr lang="en-GB" dirty="0" smtClean="0"/>
-              <a:t>Report on your progress and experience of tackling the </a:t>
-            </a:r>
-            <a:r>
-              <a:rPr lang="en-GB" dirty="0" smtClean="0"/>
-              <a:t>predictive analytics </a:t>
-            </a:r>
-            <a:r>
-              <a:rPr lang="en-GB" dirty="0" smtClean="0"/>
-              <a:t>brief.</a:t>
+              <a:t>Report on your progress and experience of tackling the predictive analytics brief.</a:t>
             </a:r>
             <a:endParaRPr lang="en-GB" dirty="0"/>
           </a:p>

</xml_diff>